<commit_message>
adding new plots and need to run new bins for jmar comments
</commit_message>
<xml_diff>
--- a/Weekly Meetings/NTUA_TopTaggerCalibration_ul.pptx
+++ b/Weekly Meetings/NTUA_TopTaggerCalibration_ul.pptx
@@ -210,7 +210,7 @@
           <a:p>
             <a:fld id="{EC97F6CE-C9BA-5B44-AF0F-C73B1C17650F}" type="datetime1">
               <a:rPr lang="en-US" smtClean="0"/>
-              <a:t>12/9/22</a:t>
+              <a:t>1/16/23</a:t>
             </a:fld>
             <a:endParaRPr lang="en-GB"/>
           </a:p>
@@ -416,7 +416,7 @@
           <a:p>
             <a:fld id="{7F9D4A26-E586-E648-884B-C9B1EA03133F}" type="datetime1">
               <a:rPr lang="en-US" smtClean="0"/>
-              <a:t>12/9/22</a:t>
+              <a:t>1/16/23</a:t>
             </a:fld>
             <a:endParaRPr lang="en-GB"/>
           </a:p>
@@ -750,7 +750,7 @@
           <a:p>
             <a:fld id="{33D9703A-F6B0-E34C-B7F9-5A8864FF4F07}" type="datetime1">
               <a:rPr lang="en-US" smtClean="0"/>
-              <a:t>12/9/22</a:t>
+              <a:t>1/16/23</a:t>
             </a:fld>
             <a:endParaRPr lang="en-GB"/>
           </a:p>
@@ -857,7 +857,7 @@
           <a:p>
             <a:fld id="{7F9D4A26-E586-E648-884B-C9B1EA03133F}" type="datetime1">
               <a:rPr lang="en-US" smtClean="0"/>
-              <a:t>12/9/22</a:t>
+              <a:t>1/16/23</a:t>
             </a:fld>
             <a:endParaRPr lang="en-GB"/>
           </a:p>
@@ -890,6 +890,113 @@
     <p:extLst>
       <p:ext uri="{BB962C8B-B14F-4D97-AF65-F5344CB8AC3E}">
         <p14:creationId xmlns:p14="http://schemas.microsoft.com/office/powerpoint/2010/main" val="3968897051"/>
+      </p:ext>
+    </p:extLst>
+  </p:cSld>
+  <p:clrMapOvr>
+    <a:masterClrMapping/>
+  </p:clrMapOvr>
+</p:notes>
+</file>
+
+<file path=ppt/notesSlides/notesSlide3.xml><?xml version="1.0" encoding="utf-8"?>
+<p:notes xmlns:a="http://schemas.openxmlformats.org/drawingml/2006/main" xmlns:r="http://schemas.openxmlformats.org/officeDocument/2006/relationships" xmlns:p="http://schemas.openxmlformats.org/presentationml/2006/main">
+  <p:cSld>
+    <p:spTree>
+      <p:nvGrpSpPr>
+        <p:cNvPr id="1" name=""/>
+        <p:cNvGrpSpPr/>
+        <p:nvPr/>
+      </p:nvGrpSpPr>
+      <p:grpSpPr>
+        <a:xfrm>
+          <a:off x="0" y="0"/>
+          <a:ext cx="0" cy="0"/>
+          <a:chOff x="0" y="0"/>
+          <a:chExt cx="0" cy="0"/>
+        </a:xfrm>
+      </p:grpSpPr>
+      <p:sp>
+        <p:nvSpPr>
+          <p:cNvPr id="2" name="Slide Image Placeholder 1"/>
+          <p:cNvSpPr>
+            <a:spLocks noGrp="1" noRot="1" noChangeAspect="1"/>
+          </p:cNvSpPr>
+          <p:nvPr>
+            <p:ph type="sldImg"/>
+          </p:nvPr>
+        </p:nvSpPr>
+        <p:spPr/>
+      </p:sp>
+      <p:sp>
+        <p:nvSpPr>
+          <p:cNvPr id="3" name="Notes Placeholder 2"/>
+          <p:cNvSpPr>
+            <a:spLocks noGrp="1"/>
+          </p:cNvSpPr>
+          <p:nvPr>
+            <p:ph type="body" idx="1"/>
+          </p:nvPr>
+        </p:nvSpPr>
+        <p:spPr/>
+        <p:txBody>
+          <a:bodyPr/>
+          <a:lstStyle/>
+          <a:p>
+            <a:endParaRPr lang="en-GR" dirty="0"/>
+          </a:p>
+        </p:txBody>
+      </p:sp>
+      <p:sp>
+        <p:nvSpPr>
+          <p:cNvPr id="4" name="Date Placeholder 3"/>
+          <p:cNvSpPr>
+            <a:spLocks noGrp="1"/>
+          </p:cNvSpPr>
+          <p:nvPr>
+            <p:ph type="dt" idx="1"/>
+          </p:nvPr>
+        </p:nvSpPr>
+        <p:spPr/>
+        <p:txBody>
+          <a:bodyPr/>
+          <a:lstStyle/>
+          <a:p>
+            <a:fld id="{7F9D4A26-E586-E648-884B-C9B1EA03133F}" type="datetime1">
+              <a:rPr lang="en-US" smtClean="0"/>
+              <a:t>1/16/23</a:t>
+            </a:fld>
+            <a:endParaRPr lang="en-GB"/>
+          </a:p>
+        </p:txBody>
+      </p:sp>
+      <p:sp>
+        <p:nvSpPr>
+          <p:cNvPr id="5" name="Slide Number Placeholder 4"/>
+          <p:cNvSpPr>
+            <a:spLocks noGrp="1"/>
+          </p:cNvSpPr>
+          <p:nvPr>
+            <p:ph type="sldNum" sz="quarter" idx="5"/>
+          </p:nvPr>
+        </p:nvSpPr>
+        <p:spPr/>
+        <p:txBody>
+          <a:bodyPr/>
+          <a:lstStyle/>
+          <a:p>
+            <a:fld id="{5033F1CD-332F-48CC-8A24-9D0A5CE7D91D}" type="slidenum">
+              <a:rPr lang="en-GB" smtClean="0"/>
+              <a:t>7</a:t>
+            </a:fld>
+            <a:endParaRPr lang="en-GB"/>
+          </a:p>
+        </p:txBody>
+      </p:sp>
+    </p:spTree>
+    <p:extLst>
+      <p:ext uri="{BB962C8B-B14F-4D97-AF65-F5344CB8AC3E}">
+        <p14:creationId xmlns:p14="http://schemas.microsoft.com/office/powerpoint/2010/main" val="3755567225"/>
       </p:ext>
     </p:extLst>
   </p:cSld>
@@ -1125,7 +1232,7 @@
           <a:p>
             <a:fld id="{DC51A3BE-CA11-4547-A39A-766971096B34}" type="datetime1">
               <a:rPr lang="en-US" smtClean="0"/>
-              <a:t>12/9/22</a:t>
+              <a:t>1/16/23</a:t>
             </a:fld>
             <a:endParaRPr lang="en-US" dirty="0"/>
           </a:p>
@@ -1332,7 +1439,7 @@
           <a:p>
             <a:fld id="{42B2CF9A-A7BF-1245-99D9-4054301C36E0}" type="datetime1">
               <a:rPr lang="en-US" smtClean="0"/>
-              <a:t>12/9/22</a:t>
+              <a:t>1/16/23</a:t>
             </a:fld>
             <a:endParaRPr lang="en-US" dirty="0"/>
           </a:p>
@@ -1587,7 +1694,7 @@
           <a:p>
             <a:fld id="{F88F3968-5050-1740-9AB7-A06844E87E5F}" type="datetime1">
               <a:rPr lang="en-US" smtClean="0"/>
-              <a:t>12/9/22</a:t>
+              <a:t>1/16/23</a:t>
             </a:fld>
             <a:endParaRPr lang="en-US" dirty="0"/>
           </a:p>
@@ -1778,7 +1885,7 @@
           <a:p>
             <a:fld id="{6A19A844-E33A-B644-A0FB-7455E93D924C}" type="datetime1">
               <a:rPr lang="en-US" smtClean="0"/>
-              <a:t>12/9/22</a:t>
+              <a:t>1/16/23</a:t>
             </a:fld>
             <a:endParaRPr lang="en-GB"/>
           </a:p>
@@ -1952,7 +2059,7 @@
           <a:p>
             <a:fld id="{F61E92BF-DA59-B546-88AE-9835521A3798}" type="datetime1">
               <a:rPr lang="en-US" smtClean="0"/>
-              <a:t>12/9/22</a:t>
+              <a:t>1/16/23</a:t>
             </a:fld>
             <a:endParaRPr lang="en-GB"/>
           </a:p>
@@ -2202,7 +2309,7 @@
           <a:p>
             <a:fld id="{61C78CAC-926A-EF4D-9608-460C3A301243}" type="datetime1">
               <a:rPr lang="en-US" smtClean="0"/>
-              <a:t>12/9/22</a:t>
+              <a:t>1/16/23</a:t>
             </a:fld>
             <a:endParaRPr lang="en-GB"/>
           </a:p>
@@ -2438,7 +2545,7 @@
           <a:p>
             <a:fld id="{32675A6D-6B9B-6546-A3DC-004E809EED54}" type="datetime1">
               <a:rPr lang="en-US" smtClean="0"/>
-              <a:t>12/9/22</a:t>
+              <a:t>1/16/23</a:t>
             </a:fld>
             <a:endParaRPr lang="en-GB"/>
           </a:p>
@@ -2809,7 +2916,7 @@
           <a:p>
             <a:fld id="{55D89806-B328-B147-9EC9-15D0307996ED}" type="datetime1">
               <a:rPr lang="en-US" smtClean="0"/>
-              <a:t>12/9/22</a:t>
+              <a:t>1/16/23</a:t>
             </a:fld>
             <a:endParaRPr lang="en-GB"/>
           </a:p>
@@ -2931,7 +3038,7 @@
           <a:p>
             <a:fld id="{702FE0D6-14B8-A94B-B441-7BA984189CE2}" type="datetime1">
               <a:rPr lang="en-US" smtClean="0"/>
-              <a:t>12/9/22</a:t>
+              <a:t>1/16/23</a:t>
             </a:fld>
             <a:endParaRPr lang="en-GB"/>
           </a:p>
@@ -3030,7 +3137,7 @@
           <a:p>
             <a:fld id="{4C294EA8-7AEB-3247-9A81-8483D03B0462}" type="datetime1">
               <a:rPr lang="en-US" smtClean="0"/>
-              <a:t>12/9/22</a:t>
+              <a:t>1/16/23</a:t>
             </a:fld>
             <a:endParaRPr lang="en-GB"/>
           </a:p>
@@ -3311,7 +3418,7 @@
           <a:p>
             <a:fld id="{D72E9315-386E-6846-8498-4330F1BBFC0A}" type="datetime1">
               <a:rPr lang="en-US" smtClean="0"/>
-              <a:t>12/9/22</a:t>
+              <a:t>1/16/23</a:t>
             </a:fld>
             <a:endParaRPr lang="en-GB"/>
           </a:p>
@@ -3467,7 +3574,7 @@
           <a:p>
             <a:fld id="{0E394EB9-E681-C34A-89D4-D81E4C62EA5B}" type="datetime1">
               <a:rPr lang="en-US" smtClean="0"/>
-              <a:t>12/9/22</a:t>
+              <a:t>1/16/23</a:t>
             </a:fld>
             <a:endParaRPr lang="en-US" dirty="0"/>
           </a:p>
@@ -3748,7 +3855,7 @@
           <a:p>
             <a:fld id="{E220BF5D-E794-2B42-91EC-2A3B4450069D}" type="datetime1">
               <a:rPr lang="en-US" smtClean="0"/>
-              <a:t>12/9/22</a:t>
+              <a:t>1/16/23</a:t>
             </a:fld>
             <a:endParaRPr lang="en-GB"/>
           </a:p>
@@ -3922,7 +4029,7 @@
           <a:p>
             <a:fld id="{BA4C039E-7082-7D42-AA91-9FF3EF6ADB5B}" type="datetime1">
               <a:rPr lang="en-US" smtClean="0"/>
-              <a:t>12/9/22</a:t>
+              <a:t>1/16/23</a:t>
             </a:fld>
             <a:endParaRPr lang="en-GB"/>
           </a:p>
@@ -4106,7 +4213,7 @@
           <a:p>
             <a:fld id="{2817B3FE-3894-A848-8D78-14007FB2FF94}" type="datetime1">
               <a:rPr lang="en-US" smtClean="0"/>
-              <a:t>12/9/22</a:t>
+              <a:t>1/16/23</a:t>
             </a:fld>
             <a:endParaRPr lang="en-GB"/>
           </a:p>
@@ -4453,7 +4560,7 @@
           <a:p>
             <a:fld id="{2DEEC64B-3E48-2F44-A6A9-A1C06A2C021E}" type="datetime1">
               <a:rPr lang="en-US" smtClean="0"/>
-              <a:t>12/9/22</a:t>
+              <a:t>1/16/23</a:t>
             </a:fld>
             <a:endParaRPr lang="en-US" dirty="0"/>
           </a:p>
@@ -4727,7 +4834,7 @@
           <a:p>
             <a:fld id="{61E195D8-183A-7F4D-8D17-8ADC90214B8A}" type="datetime1">
               <a:rPr lang="en-US" smtClean="0"/>
-              <a:t>12/9/22</a:t>
+              <a:t>1/16/23</a:t>
             </a:fld>
             <a:endParaRPr lang="en-US" dirty="0"/>
           </a:p>
@@ -5105,7 +5212,7 @@
           <a:p>
             <a:fld id="{0DD0A991-48AE-1D43-8113-23F8EAF6681B}" type="datetime1">
               <a:rPr lang="en-US" smtClean="0"/>
-              <a:t>12/9/22</a:t>
+              <a:t>1/16/23</a:t>
             </a:fld>
             <a:endParaRPr lang="en-US" dirty="0"/>
           </a:p>
@@ -5222,7 +5329,7 @@
           <a:p>
             <a:fld id="{DC12579A-EC7F-EB4A-BC5C-80733D051D29}" type="datetime1">
               <a:rPr lang="en-US" smtClean="0"/>
-              <a:t>12/9/22</a:t>
+              <a:t>1/16/23</a:t>
             </a:fld>
             <a:endParaRPr lang="en-US" dirty="0"/>
           </a:p>
@@ -5392,7 +5499,7 @@
           <a:p>
             <a:fld id="{669454CD-6DAB-7942-9B1D-8F3E2B882464}" type="datetime1">
               <a:rPr lang="en-US" smtClean="0"/>
-              <a:t>12/9/22</a:t>
+              <a:t>1/16/23</a:t>
             </a:fld>
             <a:endParaRPr lang="en-US" dirty="0"/>
           </a:p>
@@ -5776,7 +5883,7 @@
           <a:p>
             <a:fld id="{BD2CAD36-D42B-D445-A707-AA59905C7768}" type="datetime1">
               <a:rPr lang="en-US" smtClean="0"/>
-              <a:t>12/9/22</a:t>
+              <a:t>1/16/23</a:t>
             </a:fld>
             <a:endParaRPr lang="en-US" dirty="0"/>
           </a:p>
@@ -6158,7 +6265,7 @@
           <a:p>
             <a:fld id="{2D1D63B8-BB32-E649-92D4-94351543394C}" type="datetime1">
               <a:rPr lang="en-US" smtClean="0"/>
-              <a:t>12/9/22</a:t>
+              <a:t>1/16/23</a:t>
             </a:fld>
             <a:endParaRPr lang="en-US" dirty="0"/>
           </a:p>
@@ -6444,7 +6551,7 @@
           <a:p>
             <a:fld id="{FD02AE22-A9EA-FE42-BAB8-AD1D7606FF2E}" type="datetime1">
               <a:rPr lang="en-US" smtClean="0"/>
-              <a:t>12/9/22</a:t>
+              <a:t>1/16/23</a:t>
             </a:fld>
             <a:endParaRPr lang="en-US" dirty="0"/>
           </a:p>
@@ -7134,7 +7241,7 @@
           <a:p>
             <a:fld id="{307A731C-B4EF-644F-8FDB-2EBA3EC9415A}" type="datetime1">
               <a:rPr lang="en-US" smtClean="0"/>
-              <a:t>12/9/22</a:t>
+              <a:t>1/16/23</a:t>
             </a:fld>
             <a:endParaRPr lang="en-GB"/>
           </a:p>
@@ -7695,7 +7802,7 @@
           <a:p>
             <a:fld id="{37E2C1DD-94AF-5B41-A54A-0C8426B7BC1A}" type="datetime1">
               <a:rPr lang="en-US" smtClean="0"/>
-              <a:t>12/9/22</a:t>
+              <a:t>1/16/23</a:t>
             </a:fld>
             <a:endParaRPr lang="en-US" dirty="0"/>
           </a:p>
@@ -7754,8 +7861,8 @@
           </a:p>
         </p:txBody>
       </p:sp>
-      <mc:AlternateContent xmlns:mc="http://schemas.openxmlformats.org/markup-compatibility/2006">
-        <mc:Choice xmlns:a14="http://schemas.microsoft.com/office/drawing/2010/main" Requires="a14">
+      <mc:AlternateContent xmlns:mc="http://schemas.openxmlformats.org/markup-compatibility/2006" xmlns:a14="http://schemas.microsoft.com/office/drawing/2010/main">
+        <mc:Choice Requires="a14">
           <p:sp>
             <p:nvSpPr>
               <p:cNvPr id="7" name="TextBox 6"/>
@@ -8959,7 +9066,7 @@
             </p:txBody>
           </p:sp>
         </mc:Choice>
-        <mc:Fallback>
+        <mc:Fallback xmlns="">
           <p:sp>
             <p:nvSpPr>
               <p:cNvPr id="7" name="TextBox 6"/>
@@ -9179,7 +9286,7 @@
           <a:p>
             <a:fld id="{F7AFF6A5-F1FB-284A-BF72-2836D5A0B341}" type="datetime1">
               <a:rPr lang="en-US" smtClean="0"/>
-              <a:t>12/9/22</a:t>
+              <a:t>1/16/23</a:t>
             </a:fld>
             <a:endParaRPr lang="en-US" dirty="0"/>
           </a:p>
@@ -10552,7 +10659,7 @@
           <a:p>
             <a:fld id="{D52D66B2-0E0A-F441-A1DA-8039F615D612}" type="datetime1">
               <a:rPr lang="en-US" smtClean="0"/>
-              <a:t>12/9/22</a:t>
+              <a:t>1/16/23</a:t>
             </a:fld>
             <a:endParaRPr lang="en-US" dirty="0"/>
           </a:p>
@@ -10560,10 +10667,10 @@
       </p:sp>
       <p:grpSp>
         <p:nvGrpSpPr>
-          <p:cNvPr id="4" name="Group 3">
+          <p:cNvPr id="13" name="Group 12">
             <a:extLst>
               <a:ext uri="{FF2B5EF4-FFF2-40B4-BE49-F238E27FC236}">
-                <a16:creationId xmlns:a16="http://schemas.microsoft.com/office/drawing/2014/main" id="{07DFA9EE-F5A5-3940-9E83-6838000BC4F6}"/>
+                <a16:creationId xmlns:a16="http://schemas.microsoft.com/office/drawing/2014/main" id="{8AA91C5E-2EE2-D041-A606-B0C74EE8C5D2}"/>
               </a:ext>
             </a:extLst>
           </p:cNvPr>
@@ -10572,126 +10679,18 @@
         </p:nvGrpSpPr>
         <p:grpSpPr>
           <a:xfrm>
-            <a:off x="116540" y="953065"/>
-            <a:ext cx="5742725" cy="4136470"/>
-            <a:chOff x="116540" y="953065"/>
-            <a:chExt cx="5742725" cy="4136470"/>
+            <a:off x="140551" y="556310"/>
+            <a:ext cx="6858000" cy="4811220"/>
+            <a:chOff x="140551" y="278315"/>
+            <a:chExt cx="6858000" cy="4811220"/>
           </a:xfrm>
         </p:grpSpPr>
-        <p:sp>
-          <p:nvSpPr>
-            <p:cNvPr id="8" name="TextBox 7">
+        <p:pic>
+          <p:nvPicPr>
+            <p:cNvPr id="6" name="Picture 5">
               <a:extLst>
                 <a:ext uri="{FF2B5EF4-FFF2-40B4-BE49-F238E27FC236}">
-                  <a16:creationId xmlns:a16="http://schemas.microsoft.com/office/drawing/2014/main" id="{D9B8B606-EDF5-3B44-8A94-766A8E1FE97B}"/>
-                </a:ext>
-              </a:extLst>
-            </p:cNvPr>
-            <p:cNvSpPr txBox="1"/>
-            <p:nvPr/>
-          </p:nvSpPr>
-          <p:spPr>
-            <a:xfrm>
-              <a:off x="445301" y="4781758"/>
-              <a:ext cx="1715249" cy="307777"/>
-            </a:xfrm>
-            <a:prstGeom prst="rect">
-              <a:avLst/>
-            </a:prstGeom>
-            <a:noFill/>
-          </p:spPr>
-          <p:txBody>
-            <a:bodyPr wrap="square" rtlCol="0">
-              <a:spAutoFit/>
-            </a:bodyPr>
-            <a:lstStyle/>
-            <a:p>
-              <a:pPr algn="ctr"/>
-              <a:r>
-                <a:rPr lang="en-GR" sz="1400" dirty="0"/>
-                <a:t>pT [400,600]GeV</a:t>
-              </a:r>
-            </a:p>
-          </p:txBody>
-        </p:sp>
-        <p:sp>
-          <p:nvSpPr>
-            <p:cNvPr id="9" name="TextBox 8">
-              <a:extLst>
-                <a:ext uri="{FF2B5EF4-FFF2-40B4-BE49-F238E27FC236}">
-                  <a16:creationId xmlns:a16="http://schemas.microsoft.com/office/drawing/2014/main" id="{B1698263-1BCA-0B41-A94C-72DE5758CAAB}"/>
-                </a:ext>
-              </a:extLst>
-            </p:cNvPr>
-            <p:cNvSpPr txBox="1"/>
-            <p:nvPr/>
-          </p:nvSpPr>
-          <p:spPr>
-            <a:xfrm>
-              <a:off x="2160550" y="4781757"/>
-              <a:ext cx="1715249" cy="307777"/>
-            </a:xfrm>
-            <a:prstGeom prst="rect">
-              <a:avLst/>
-            </a:prstGeom>
-            <a:noFill/>
-          </p:spPr>
-          <p:txBody>
-            <a:bodyPr wrap="square" rtlCol="0">
-              <a:spAutoFit/>
-            </a:bodyPr>
-            <a:lstStyle/>
-            <a:p>
-              <a:pPr algn="ctr"/>
-              <a:r>
-                <a:rPr lang="en-GR" sz="1400" dirty="0"/>
-                <a:t>pT [600,800]GeV</a:t>
-              </a:r>
-            </a:p>
-          </p:txBody>
-        </p:sp>
-        <p:sp>
-          <p:nvSpPr>
-            <p:cNvPr id="10" name="TextBox 9">
-              <a:extLst>
-                <a:ext uri="{FF2B5EF4-FFF2-40B4-BE49-F238E27FC236}">
-                  <a16:creationId xmlns:a16="http://schemas.microsoft.com/office/drawing/2014/main" id="{D308A89B-D18E-0348-AA8C-73E51BEEDB07}"/>
-                </a:ext>
-              </a:extLst>
-            </p:cNvPr>
-            <p:cNvSpPr txBox="1"/>
-            <p:nvPr/>
-          </p:nvSpPr>
-          <p:spPr>
-            <a:xfrm>
-              <a:off x="3875799" y="4781757"/>
-              <a:ext cx="1715249" cy="307777"/>
-            </a:xfrm>
-            <a:prstGeom prst="rect">
-              <a:avLst/>
-            </a:prstGeom>
-            <a:noFill/>
-          </p:spPr>
-          <p:txBody>
-            <a:bodyPr wrap="square" rtlCol="0">
-              <a:spAutoFit/>
-            </a:bodyPr>
-            <a:lstStyle/>
-            <a:p>
-              <a:pPr algn="ctr"/>
-              <a:r>
-                <a:rPr lang="en-GR" sz="1400" dirty="0"/>
-                <a:t>pT [800,Inf]GeV</a:t>
-              </a:r>
-            </a:p>
-          </p:txBody>
-        </p:sp>
-        <p:pic>
-          <p:nvPicPr>
-            <p:cNvPr id="11" name="Picture 10">
-              <a:extLst>
-                <a:ext uri="{FF2B5EF4-FFF2-40B4-BE49-F238E27FC236}">
-                  <a16:creationId xmlns:a16="http://schemas.microsoft.com/office/drawing/2014/main" id="{A0A4E831-9BAF-3A40-8B36-C3D3D61D5971}"/>
+                  <a16:creationId xmlns:a16="http://schemas.microsoft.com/office/drawing/2014/main" id="{907CEB25-F107-7F40-BF9D-1C8631A04A44}"/>
                 </a:ext>
               </a:extLst>
             </p:cNvPr>
@@ -10702,19 +10701,148 @@
           </p:nvPicPr>
           <p:blipFill rotWithShape="1">
             <a:blip r:embed="rId2"/>
-            <a:srcRect t="313" r="10004"/>
+            <a:srcRect r="8965"/>
             <a:stretch/>
           </p:blipFill>
           <p:spPr>
             <a:xfrm rot="5400000">
-              <a:off x="1118045" y="-48440"/>
-              <a:ext cx="3739715" cy="5742725"/>
+              <a:off x="1317830" y="-898964"/>
+              <a:ext cx="4503442" cy="6858000"/>
             </a:xfrm>
             <a:prstGeom prst="rect">
               <a:avLst/>
             </a:prstGeom>
           </p:spPr>
         </p:pic>
+        <p:grpSp>
+          <p:nvGrpSpPr>
+            <p:cNvPr id="4" name="Group 3">
+              <a:extLst>
+                <a:ext uri="{FF2B5EF4-FFF2-40B4-BE49-F238E27FC236}">
+                  <a16:creationId xmlns:a16="http://schemas.microsoft.com/office/drawing/2014/main" id="{07DFA9EE-F5A5-3940-9E83-6838000BC4F6}"/>
+                </a:ext>
+              </a:extLst>
+            </p:cNvPr>
+            <p:cNvGrpSpPr/>
+            <p:nvPr/>
+          </p:nvGrpSpPr>
+          <p:grpSpPr>
+            <a:xfrm>
+              <a:off x="445301" y="4781757"/>
+              <a:ext cx="5145747" cy="307778"/>
+              <a:chOff x="445301" y="4781757"/>
+              <a:chExt cx="5145747" cy="307778"/>
+            </a:xfrm>
+          </p:grpSpPr>
+          <p:sp>
+            <p:nvSpPr>
+              <p:cNvPr id="8" name="TextBox 7">
+                <a:extLst>
+                  <a:ext uri="{FF2B5EF4-FFF2-40B4-BE49-F238E27FC236}">
+                    <a16:creationId xmlns:a16="http://schemas.microsoft.com/office/drawing/2014/main" id="{D9B8B606-EDF5-3B44-8A94-766A8E1FE97B}"/>
+                  </a:ext>
+                </a:extLst>
+              </p:cNvPr>
+              <p:cNvSpPr txBox="1"/>
+              <p:nvPr/>
+            </p:nvSpPr>
+            <p:spPr>
+              <a:xfrm>
+                <a:off x="445301" y="4781758"/>
+                <a:ext cx="1715249" cy="307777"/>
+              </a:xfrm>
+              <a:prstGeom prst="rect">
+                <a:avLst/>
+              </a:prstGeom>
+              <a:noFill/>
+            </p:spPr>
+            <p:txBody>
+              <a:bodyPr wrap="square" rtlCol="0">
+                <a:spAutoFit/>
+              </a:bodyPr>
+              <a:lstStyle/>
+              <a:p>
+                <a:pPr algn="ctr"/>
+                <a:r>
+                  <a:rPr lang="en-GR" sz="1400" dirty="0"/>
+                  <a:t>pT [400,600]GeV</a:t>
+                </a:r>
+              </a:p>
+            </p:txBody>
+          </p:sp>
+          <p:sp>
+            <p:nvSpPr>
+              <p:cNvPr id="9" name="TextBox 8">
+                <a:extLst>
+                  <a:ext uri="{FF2B5EF4-FFF2-40B4-BE49-F238E27FC236}">
+                    <a16:creationId xmlns:a16="http://schemas.microsoft.com/office/drawing/2014/main" id="{B1698263-1BCA-0B41-A94C-72DE5758CAAB}"/>
+                  </a:ext>
+                </a:extLst>
+              </p:cNvPr>
+              <p:cNvSpPr txBox="1"/>
+              <p:nvPr/>
+            </p:nvSpPr>
+            <p:spPr>
+              <a:xfrm>
+                <a:off x="2160550" y="4781757"/>
+                <a:ext cx="1715249" cy="307777"/>
+              </a:xfrm>
+              <a:prstGeom prst="rect">
+                <a:avLst/>
+              </a:prstGeom>
+              <a:noFill/>
+            </p:spPr>
+            <p:txBody>
+              <a:bodyPr wrap="square" rtlCol="0">
+                <a:spAutoFit/>
+              </a:bodyPr>
+              <a:lstStyle/>
+              <a:p>
+                <a:pPr algn="ctr"/>
+                <a:r>
+                  <a:rPr lang="en-GR" sz="1400" dirty="0"/>
+                  <a:t>pT [600,800]GeV</a:t>
+                </a:r>
+              </a:p>
+            </p:txBody>
+          </p:sp>
+          <p:sp>
+            <p:nvSpPr>
+              <p:cNvPr id="10" name="TextBox 9">
+                <a:extLst>
+                  <a:ext uri="{FF2B5EF4-FFF2-40B4-BE49-F238E27FC236}">
+                    <a16:creationId xmlns:a16="http://schemas.microsoft.com/office/drawing/2014/main" id="{D308A89B-D18E-0348-AA8C-73E51BEEDB07}"/>
+                  </a:ext>
+                </a:extLst>
+              </p:cNvPr>
+              <p:cNvSpPr txBox="1"/>
+              <p:nvPr/>
+            </p:nvSpPr>
+            <p:spPr>
+              <a:xfrm>
+                <a:off x="3875799" y="4781757"/>
+                <a:ext cx="1715249" cy="307777"/>
+              </a:xfrm>
+              <a:prstGeom prst="rect">
+                <a:avLst/>
+              </a:prstGeom>
+              <a:noFill/>
+            </p:spPr>
+            <p:txBody>
+              <a:bodyPr wrap="square" rtlCol="0">
+                <a:spAutoFit/>
+              </a:bodyPr>
+              <a:lstStyle/>
+              <a:p>
+                <a:pPr algn="ctr"/>
+                <a:r>
+                  <a:rPr lang="en-GR" sz="1400" dirty="0"/>
+                  <a:t>pT [800,Inf]GeV</a:t>
+                </a:r>
+              </a:p>
+            </p:txBody>
+          </p:sp>
+        </p:grpSp>
       </p:grpSp>
       <p:sp>
         <p:nvSpPr>
@@ -11072,7 +11200,7 @@
           <a:p>
             <a:fld id="{D52D66B2-0E0A-F441-A1DA-8039F615D612}" type="datetime1">
               <a:rPr lang="en-US" smtClean="0"/>
-              <a:t>12/9/22</a:t>
+              <a:t>1/16/23</a:t>
             </a:fld>
             <a:endParaRPr lang="en-US" dirty="0"/>
           </a:p>
@@ -11288,10 +11416,10 @@
       </p:sp>
       <p:grpSp>
         <p:nvGrpSpPr>
-          <p:cNvPr id="14" name="Group 13">
+          <p:cNvPr id="6" name="Group 5">
             <a:extLst>
               <a:ext uri="{FF2B5EF4-FFF2-40B4-BE49-F238E27FC236}">
-                <a16:creationId xmlns:a16="http://schemas.microsoft.com/office/drawing/2014/main" id="{3DB77BE6-2DE6-A444-8ABC-C66DF2CCED41}"/>
+                <a16:creationId xmlns:a16="http://schemas.microsoft.com/office/drawing/2014/main" id="{7B492F08-E20D-244B-9B23-96B2CD1162C2}"/>
               </a:ext>
             </a:extLst>
           </p:cNvPr>
@@ -11300,18 +11428,18 @@
         </p:nvGrpSpPr>
         <p:grpSpPr>
           <a:xfrm>
-            <a:off x="87086" y="842658"/>
-            <a:ext cx="5760720" cy="4246877"/>
-            <a:chOff x="87086" y="842658"/>
-            <a:chExt cx="5760720" cy="4246877"/>
+            <a:off x="140551" y="618521"/>
+            <a:ext cx="6858000" cy="4794835"/>
+            <a:chOff x="140552" y="294700"/>
+            <a:chExt cx="6858000" cy="4794835"/>
           </a:xfrm>
         </p:grpSpPr>
         <p:pic>
           <p:nvPicPr>
-            <p:cNvPr id="13" name="Picture 12">
+            <p:cNvPr id="4" name="Picture 3">
               <a:extLst>
                 <a:ext uri="{FF2B5EF4-FFF2-40B4-BE49-F238E27FC236}">
-                  <a16:creationId xmlns:a16="http://schemas.microsoft.com/office/drawing/2014/main" id="{BD39E054-4B69-8E46-904B-EE952A01BE20}"/>
+                  <a16:creationId xmlns:a16="http://schemas.microsoft.com/office/drawing/2014/main" id="{E15DD8F0-C3FC-6544-B578-22B0774C862C}"/>
                 </a:ext>
               </a:extLst>
             </p:cNvPr>
@@ -11322,127 +11450,148 @@
           </p:nvPicPr>
           <p:blipFill rotWithShape="1">
             <a:blip r:embed="rId2"/>
-            <a:srcRect r="9185"/>
+            <a:srcRect r="9650"/>
             <a:stretch/>
           </p:blipFill>
           <p:spPr>
             <a:xfrm rot="5400000">
-              <a:off x="1080581" y="-150837"/>
-              <a:ext cx="3773730" cy="5760720"/>
+              <a:off x="1334763" y="-899511"/>
+              <a:ext cx="4469577" cy="6858000"/>
             </a:xfrm>
             <a:prstGeom prst="rect">
               <a:avLst/>
             </a:prstGeom>
           </p:spPr>
         </p:pic>
-        <p:sp>
-          <p:nvSpPr>
-            <p:cNvPr id="15" name="TextBox 14">
+        <p:grpSp>
+          <p:nvGrpSpPr>
+            <p:cNvPr id="14" name="Group 13">
               <a:extLst>
                 <a:ext uri="{FF2B5EF4-FFF2-40B4-BE49-F238E27FC236}">
-                  <a16:creationId xmlns:a16="http://schemas.microsoft.com/office/drawing/2014/main" id="{A3121998-8889-2549-8465-0D99407673EA}"/>
+                  <a16:creationId xmlns:a16="http://schemas.microsoft.com/office/drawing/2014/main" id="{3DB77BE6-2DE6-A444-8ABC-C66DF2CCED41}"/>
                 </a:ext>
               </a:extLst>
             </p:cNvPr>
-            <p:cNvSpPr txBox="1"/>
+            <p:cNvGrpSpPr/>
             <p:nvPr/>
-          </p:nvSpPr>
-          <p:spPr>
+          </p:nvGrpSpPr>
+          <p:grpSpPr>
             <a:xfrm>
-              <a:off x="445301" y="4781758"/>
-              <a:ext cx="1715249" cy="307777"/>
+              <a:off x="445301" y="4781757"/>
+              <a:ext cx="5145747" cy="307778"/>
+              <a:chOff x="445301" y="4781757"/>
+              <a:chExt cx="5145747" cy="307778"/>
             </a:xfrm>
-            <a:prstGeom prst="rect">
-              <a:avLst/>
-            </a:prstGeom>
-            <a:noFill/>
-          </p:spPr>
-          <p:txBody>
-            <a:bodyPr wrap="square" rtlCol="0">
-              <a:spAutoFit/>
-            </a:bodyPr>
-            <a:lstStyle/>
-            <a:p>
-              <a:pPr algn="ctr"/>
-              <a:r>
-                <a:rPr lang="en-GR" sz="1400" dirty="0"/>
-                <a:t>pT [400,600]GeV</a:t>
-              </a:r>
-            </a:p>
-          </p:txBody>
-        </p:sp>
-        <p:sp>
-          <p:nvSpPr>
-            <p:cNvPr id="16" name="TextBox 15">
-              <a:extLst>
-                <a:ext uri="{FF2B5EF4-FFF2-40B4-BE49-F238E27FC236}">
-                  <a16:creationId xmlns:a16="http://schemas.microsoft.com/office/drawing/2014/main" id="{09C3DCAB-E02E-3948-B077-E43290A9B8B3}"/>
-                </a:ext>
-              </a:extLst>
-            </p:cNvPr>
-            <p:cNvSpPr txBox="1"/>
-            <p:nvPr/>
-          </p:nvSpPr>
-          <p:spPr>
-            <a:xfrm>
-              <a:off x="2160550" y="4781757"/>
-              <a:ext cx="1715249" cy="307777"/>
-            </a:xfrm>
-            <a:prstGeom prst="rect">
-              <a:avLst/>
-            </a:prstGeom>
-            <a:noFill/>
-          </p:spPr>
-          <p:txBody>
-            <a:bodyPr wrap="square" rtlCol="0">
-              <a:spAutoFit/>
-            </a:bodyPr>
-            <a:lstStyle/>
-            <a:p>
-              <a:pPr algn="ctr"/>
-              <a:r>
-                <a:rPr lang="en-GR" sz="1400" dirty="0"/>
-                <a:t>pT [600,800]GeV</a:t>
-              </a:r>
-            </a:p>
-          </p:txBody>
-        </p:sp>
-        <p:sp>
-          <p:nvSpPr>
-            <p:cNvPr id="17" name="TextBox 16">
-              <a:extLst>
-                <a:ext uri="{FF2B5EF4-FFF2-40B4-BE49-F238E27FC236}">
-                  <a16:creationId xmlns:a16="http://schemas.microsoft.com/office/drawing/2014/main" id="{DA3CEF5A-6EB5-5447-AC0B-9510D4D67E22}"/>
-                </a:ext>
-              </a:extLst>
-            </p:cNvPr>
-            <p:cNvSpPr txBox="1"/>
-            <p:nvPr/>
-          </p:nvSpPr>
-          <p:spPr>
-            <a:xfrm>
-              <a:off x="3875799" y="4781757"/>
-              <a:ext cx="1715249" cy="307777"/>
-            </a:xfrm>
-            <a:prstGeom prst="rect">
-              <a:avLst/>
-            </a:prstGeom>
-            <a:noFill/>
-          </p:spPr>
-          <p:txBody>
-            <a:bodyPr wrap="square" rtlCol="0">
-              <a:spAutoFit/>
-            </a:bodyPr>
-            <a:lstStyle/>
-            <a:p>
-              <a:pPr algn="ctr"/>
-              <a:r>
-                <a:rPr lang="en-GR" sz="1400" dirty="0"/>
-                <a:t>pT [800,Inf]GeV</a:t>
-              </a:r>
-            </a:p>
-          </p:txBody>
-        </p:sp>
+          </p:grpSpPr>
+          <p:sp>
+            <p:nvSpPr>
+              <p:cNvPr id="15" name="TextBox 14">
+                <a:extLst>
+                  <a:ext uri="{FF2B5EF4-FFF2-40B4-BE49-F238E27FC236}">
+                    <a16:creationId xmlns:a16="http://schemas.microsoft.com/office/drawing/2014/main" id="{A3121998-8889-2549-8465-0D99407673EA}"/>
+                  </a:ext>
+                </a:extLst>
+              </p:cNvPr>
+              <p:cNvSpPr txBox="1"/>
+              <p:nvPr/>
+            </p:nvSpPr>
+            <p:spPr>
+              <a:xfrm>
+                <a:off x="445301" y="4781758"/>
+                <a:ext cx="1715249" cy="307777"/>
+              </a:xfrm>
+              <a:prstGeom prst="rect">
+                <a:avLst/>
+              </a:prstGeom>
+              <a:noFill/>
+            </p:spPr>
+            <p:txBody>
+              <a:bodyPr wrap="square" rtlCol="0">
+                <a:spAutoFit/>
+              </a:bodyPr>
+              <a:lstStyle/>
+              <a:p>
+                <a:pPr algn="ctr"/>
+                <a:r>
+                  <a:rPr lang="en-GR" sz="1400" dirty="0"/>
+                  <a:t>pT [400,600]GeV</a:t>
+                </a:r>
+              </a:p>
+            </p:txBody>
+          </p:sp>
+          <p:sp>
+            <p:nvSpPr>
+              <p:cNvPr id="16" name="TextBox 15">
+                <a:extLst>
+                  <a:ext uri="{FF2B5EF4-FFF2-40B4-BE49-F238E27FC236}">
+                    <a16:creationId xmlns:a16="http://schemas.microsoft.com/office/drawing/2014/main" id="{09C3DCAB-E02E-3948-B077-E43290A9B8B3}"/>
+                  </a:ext>
+                </a:extLst>
+              </p:cNvPr>
+              <p:cNvSpPr txBox="1"/>
+              <p:nvPr/>
+            </p:nvSpPr>
+            <p:spPr>
+              <a:xfrm>
+                <a:off x="2160550" y="4781757"/>
+                <a:ext cx="1715249" cy="307777"/>
+              </a:xfrm>
+              <a:prstGeom prst="rect">
+                <a:avLst/>
+              </a:prstGeom>
+              <a:noFill/>
+            </p:spPr>
+            <p:txBody>
+              <a:bodyPr wrap="square" rtlCol="0">
+                <a:spAutoFit/>
+              </a:bodyPr>
+              <a:lstStyle/>
+              <a:p>
+                <a:pPr algn="ctr"/>
+                <a:r>
+                  <a:rPr lang="en-GR" sz="1400" dirty="0"/>
+                  <a:t>pT [600,800]GeV</a:t>
+                </a:r>
+              </a:p>
+            </p:txBody>
+          </p:sp>
+          <p:sp>
+            <p:nvSpPr>
+              <p:cNvPr id="17" name="TextBox 16">
+                <a:extLst>
+                  <a:ext uri="{FF2B5EF4-FFF2-40B4-BE49-F238E27FC236}">
+                    <a16:creationId xmlns:a16="http://schemas.microsoft.com/office/drawing/2014/main" id="{DA3CEF5A-6EB5-5447-AC0B-9510D4D67E22}"/>
+                  </a:ext>
+                </a:extLst>
+              </p:cNvPr>
+              <p:cNvSpPr txBox="1"/>
+              <p:nvPr/>
+            </p:nvSpPr>
+            <p:spPr>
+              <a:xfrm>
+                <a:off x="3875799" y="4781757"/>
+                <a:ext cx="1715249" cy="307777"/>
+              </a:xfrm>
+              <a:prstGeom prst="rect">
+                <a:avLst/>
+              </a:prstGeom>
+              <a:noFill/>
+            </p:spPr>
+            <p:txBody>
+              <a:bodyPr wrap="square" rtlCol="0">
+                <a:spAutoFit/>
+              </a:bodyPr>
+              <a:lstStyle/>
+              <a:p>
+                <a:pPr algn="ctr"/>
+                <a:r>
+                  <a:rPr lang="en-GR" sz="1400" dirty="0"/>
+                  <a:t>pT [800,Inf]GeV</a:t>
+                </a:r>
+              </a:p>
+            </p:txBody>
+          </p:sp>
+        </p:grpSp>
       </p:grpSp>
     </p:spTree>
     <p:extLst>
@@ -11595,7 +11744,7 @@
           <a:p>
             <a:fld id="{D52D66B2-0E0A-F441-A1DA-8039F615D612}" type="datetime1">
               <a:rPr lang="en-US" smtClean="0"/>
-              <a:t>12/9/22</a:t>
+              <a:t>1/16/23</a:t>
             </a:fld>
             <a:endParaRPr lang="en-US" dirty="0"/>
           </a:p>
@@ -11808,10 +11957,10 @@
       </p:sp>
       <p:grpSp>
         <p:nvGrpSpPr>
-          <p:cNvPr id="8" name="Group 7">
+          <p:cNvPr id="13" name="Group 12">
             <a:extLst>
               <a:ext uri="{FF2B5EF4-FFF2-40B4-BE49-F238E27FC236}">
-                <a16:creationId xmlns:a16="http://schemas.microsoft.com/office/drawing/2014/main" id="{2AD30038-E907-DA48-A5C7-37D04B4D1A37}"/>
+                <a16:creationId xmlns:a16="http://schemas.microsoft.com/office/drawing/2014/main" id="{5C7B5240-B53A-E841-8526-D9CB22DF9E06}"/>
               </a:ext>
             </a:extLst>
           </p:cNvPr>
@@ -11820,126 +11969,147 @@
         </p:nvGrpSpPr>
         <p:grpSpPr>
           <a:xfrm>
-            <a:off x="80131" y="849752"/>
-            <a:ext cx="5760720" cy="4194476"/>
-            <a:chOff x="80131" y="849752"/>
-            <a:chExt cx="5760720" cy="4194476"/>
+            <a:off x="140551" y="556310"/>
+            <a:ext cx="6858000" cy="4779388"/>
+            <a:chOff x="140551" y="264840"/>
+            <a:chExt cx="6858000" cy="4779388"/>
           </a:xfrm>
         </p:grpSpPr>
-        <p:sp>
-          <p:nvSpPr>
-            <p:cNvPr id="9" name="TextBox 8">
+        <p:grpSp>
+          <p:nvGrpSpPr>
+            <p:cNvPr id="8" name="Group 7">
               <a:extLst>
                 <a:ext uri="{FF2B5EF4-FFF2-40B4-BE49-F238E27FC236}">
-                  <a16:creationId xmlns:a16="http://schemas.microsoft.com/office/drawing/2014/main" id="{FC00C06C-9F10-2649-B24A-098D731DA5FB}"/>
+                  <a16:creationId xmlns:a16="http://schemas.microsoft.com/office/drawing/2014/main" id="{2AD30038-E907-DA48-A5C7-37D04B4D1A37}"/>
                 </a:ext>
               </a:extLst>
             </p:cNvPr>
-            <p:cNvSpPr txBox="1"/>
+            <p:cNvGrpSpPr/>
             <p:nvPr/>
-          </p:nvSpPr>
-          <p:spPr>
+          </p:nvGrpSpPr>
+          <p:grpSpPr>
             <a:xfrm>
-              <a:off x="239655" y="4736451"/>
-              <a:ext cx="1715249" cy="307777"/>
+              <a:off x="239655" y="4736449"/>
+              <a:ext cx="5293709" cy="307779"/>
+              <a:chOff x="239655" y="4736449"/>
+              <a:chExt cx="5293709" cy="307779"/>
             </a:xfrm>
-            <a:prstGeom prst="rect">
-              <a:avLst/>
-            </a:prstGeom>
-            <a:noFill/>
-          </p:spPr>
-          <p:txBody>
-            <a:bodyPr wrap="square" rtlCol="0">
-              <a:spAutoFit/>
-            </a:bodyPr>
-            <a:lstStyle/>
-            <a:p>
-              <a:pPr algn="ctr"/>
-              <a:r>
-                <a:rPr lang="en-GR" sz="1400" dirty="0"/>
-                <a:t>pT [400,600]GeV</a:t>
-              </a:r>
-            </a:p>
-          </p:txBody>
-        </p:sp>
-        <p:sp>
-          <p:nvSpPr>
-            <p:cNvPr id="10" name="TextBox 9">
+          </p:grpSpPr>
+          <p:sp>
+            <p:nvSpPr>
+              <p:cNvPr id="9" name="TextBox 8">
+                <a:extLst>
+                  <a:ext uri="{FF2B5EF4-FFF2-40B4-BE49-F238E27FC236}">
+                    <a16:creationId xmlns:a16="http://schemas.microsoft.com/office/drawing/2014/main" id="{FC00C06C-9F10-2649-B24A-098D731DA5FB}"/>
+                  </a:ext>
+                </a:extLst>
+              </p:cNvPr>
+              <p:cNvSpPr txBox="1"/>
+              <p:nvPr/>
+            </p:nvSpPr>
+            <p:spPr>
+              <a:xfrm>
+                <a:off x="239655" y="4736451"/>
+                <a:ext cx="1715249" cy="307777"/>
+              </a:xfrm>
+              <a:prstGeom prst="rect">
+                <a:avLst/>
+              </a:prstGeom>
+              <a:noFill/>
+            </p:spPr>
+            <p:txBody>
+              <a:bodyPr wrap="square" rtlCol="0">
+                <a:spAutoFit/>
+              </a:bodyPr>
+              <a:lstStyle/>
+              <a:p>
+                <a:pPr algn="ctr"/>
+                <a:r>
+                  <a:rPr lang="en-GR" sz="1400" dirty="0"/>
+                  <a:t>pT [400,600]GeV</a:t>
+                </a:r>
+              </a:p>
+            </p:txBody>
+          </p:sp>
+          <p:sp>
+            <p:nvSpPr>
+              <p:cNvPr id="10" name="TextBox 9">
+                <a:extLst>
+                  <a:ext uri="{FF2B5EF4-FFF2-40B4-BE49-F238E27FC236}">
+                    <a16:creationId xmlns:a16="http://schemas.microsoft.com/office/drawing/2014/main" id="{1ADC7590-FE05-5B40-BD53-33099AB31425}"/>
+                  </a:ext>
+                </a:extLst>
+              </p:cNvPr>
+              <p:cNvSpPr txBox="1"/>
+              <p:nvPr/>
+            </p:nvSpPr>
+            <p:spPr>
+              <a:xfrm>
+                <a:off x="2028885" y="4736449"/>
+                <a:ext cx="1715249" cy="307777"/>
+              </a:xfrm>
+              <a:prstGeom prst="rect">
+                <a:avLst/>
+              </a:prstGeom>
+              <a:noFill/>
+            </p:spPr>
+            <p:txBody>
+              <a:bodyPr wrap="square" rtlCol="0">
+                <a:spAutoFit/>
+              </a:bodyPr>
+              <a:lstStyle/>
+              <a:p>
+                <a:pPr algn="ctr"/>
+                <a:r>
+                  <a:rPr lang="en-GR" sz="1400" dirty="0"/>
+                  <a:t>pT [600,800]GeV</a:t>
+                </a:r>
+              </a:p>
+            </p:txBody>
+          </p:sp>
+          <p:sp>
+            <p:nvSpPr>
+              <p:cNvPr id="11" name="TextBox 10">
+                <a:extLst>
+                  <a:ext uri="{FF2B5EF4-FFF2-40B4-BE49-F238E27FC236}">
+                    <a16:creationId xmlns:a16="http://schemas.microsoft.com/office/drawing/2014/main" id="{A0A97159-9A12-2A47-9505-6DD64CA8837A}"/>
+                  </a:ext>
+                </a:extLst>
+              </p:cNvPr>
+              <p:cNvSpPr txBox="1"/>
+              <p:nvPr/>
+            </p:nvSpPr>
+            <p:spPr>
+              <a:xfrm>
+                <a:off x="3818115" y="4736450"/>
+                <a:ext cx="1715249" cy="307777"/>
+              </a:xfrm>
+              <a:prstGeom prst="rect">
+                <a:avLst/>
+              </a:prstGeom>
+              <a:noFill/>
+            </p:spPr>
+            <p:txBody>
+              <a:bodyPr wrap="square" rtlCol="0">
+                <a:spAutoFit/>
+              </a:bodyPr>
+              <a:lstStyle/>
+              <a:p>
+                <a:pPr algn="ctr"/>
+                <a:r>
+                  <a:rPr lang="en-GR" sz="1400" dirty="0"/>
+                  <a:t>pT [800,Inf]GeV</a:t>
+                </a:r>
+              </a:p>
+            </p:txBody>
+          </p:sp>
+        </p:grpSp>
+        <p:pic>
+          <p:nvPicPr>
+            <p:cNvPr id="4" name="Picture 3">
               <a:extLst>
                 <a:ext uri="{FF2B5EF4-FFF2-40B4-BE49-F238E27FC236}">
-                  <a16:creationId xmlns:a16="http://schemas.microsoft.com/office/drawing/2014/main" id="{1ADC7590-FE05-5B40-BD53-33099AB31425}"/>
-                </a:ext>
-              </a:extLst>
-            </p:cNvPr>
-            <p:cNvSpPr txBox="1"/>
-            <p:nvPr/>
-          </p:nvSpPr>
-          <p:spPr>
-            <a:xfrm>
-              <a:off x="2028885" y="4736449"/>
-              <a:ext cx="1715249" cy="307777"/>
-            </a:xfrm>
-            <a:prstGeom prst="rect">
-              <a:avLst/>
-            </a:prstGeom>
-            <a:noFill/>
-          </p:spPr>
-          <p:txBody>
-            <a:bodyPr wrap="square" rtlCol="0">
-              <a:spAutoFit/>
-            </a:bodyPr>
-            <a:lstStyle/>
-            <a:p>
-              <a:pPr algn="ctr"/>
-              <a:r>
-                <a:rPr lang="en-GR" sz="1400" dirty="0"/>
-                <a:t>pT [600,800]GeV</a:t>
-              </a:r>
-            </a:p>
-          </p:txBody>
-        </p:sp>
-        <p:sp>
-          <p:nvSpPr>
-            <p:cNvPr id="11" name="TextBox 10">
-              <a:extLst>
-                <a:ext uri="{FF2B5EF4-FFF2-40B4-BE49-F238E27FC236}">
-                  <a16:creationId xmlns:a16="http://schemas.microsoft.com/office/drawing/2014/main" id="{A0A97159-9A12-2A47-9505-6DD64CA8837A}"/>
-                </a:ext>
-              </a:extLst>
-            </p:cNvPr>
-            <p:cNvSpPr txBox="1"/>
-            <p:nvPr/>
-          </p:nvSpPr>
-          <p:spPr>
-            <a:xfrm>
-              <a:off x="3818115" y="4736450"/>
-              <a:ext cx="1715249" cy="307777"/>
-            </a:xfrm>
-            <a:prstGeom prst="rect">
-              <a:avLst/>
-            </a:prstGeom>
-            <a:noFill/>
-          </p:spPr>
-          <p:txBody>
-            <a:bodyPr wrap="square" rtlCol="0">
-              <a:spAutoFit/>
-            </a:bodyPr>
-            <a:lstStyle/>
-            <a:p>
-              <a:pPr algn="ctr"/>
-              <a:r>
-                <a:rPr lang="en-GR" sz="1400" dirty="0"/>
-                <a:t>pT [800,Inf]GeV</a:t>
-              </a:r>
-            </a:p>
-          </p:txBody>
-        </p:sp>
-        <p:pic>
-          <p:nvPicPr>
-            <p:cNvPr id="6" name="Picture 5">
-              <a:extLst>
-                <a:ext uri="{FF2B5EF4-FFF2-40B4-BE49-F238E27FC236}">
-                  <a16:creationId xmlns:a16="http://schemas.microsoft.com/office/drawing/2014/main" id="{AF9B5CE8-BDBB-4948-8C2D-083BACEBEF23}"/>
+                  <a16:creationId xmlns:a16="http://schemas.microsoft.com/office/drawing/2014/main" id="{1594AB5A-1A17-AD47-ADCA-741FE2E70DA2}"/>
                 </a:ext>
               </a:extLst>
             </p:cNvPr>
@@ -11950,13 +12120,13 @@
           </p:nvPicPr>
           <p:blipFill rotWithShape="1">
             <a:blip r:embed="rId2"/>
-            <a:srcRect r="9570"/>
+            <a:srcRect r="9609"/>
             <a:stretch/>
           </p:blipFill>
           <p:spPr>
             <a:xfrm rot="5400000">
-              <a:off x="1081611" y="-151728"/>
-              <a:ext cx="3757760" cy="5760720"/>
+              <a:off x="1333746" y="-928355"/>
+              <a:ext cx="4471609" cy="6858000"/>
             </a:xfrm>
             <a:prstGeom prst="rect">
               <a:avLst/>
@@ -12115,7 +12285,7 @@
           <a:p>
             <a:fld id="{D52D66B2-0E0A-F441-A1DA-8039F615D612}" type="datetime1">
               <a:rPr lang="en-US" smtClean="0"/>
-              <a:t>12/9/22</a:t>
+              <a:t>1/16/23</a:t>
             </a:fld>
             <a:endParaRPr lang="en-US" dirty="0"/>
           </a:p>
@@ -12328,10 +12498,10 @@
       </p:sp>
       <p:grpSp>
         <p:nvGrpSpPr>
-          <p:cNvPr id="18" name="Group 17">
+          <p:cNvPr id="6" name="Group 5">
             <a:extLst>
               <a:ext uri="{FF2B5EF4-FFF2-40B4-BE49-F238E27FC236}">
-                <a16:creationId xmlns:a16="http://schemas.microsoft.com/office/drawing/2014/main" id="{5EAA8B74-D7BA-9D40-B2B4-DA4678ED5A9D}"/>
+                <a16:creationId xmlns:a16="http://schemas.microsoft.com/office/drawing/2014/main" id="{898FA63C-B241-A24E-A6C6-0617C3B9D631}"/>
               </a:ext>
             </a:extLst>
           </p:cNvPr>
@@ -12340,18 +12510,18 @@
         </p:nvGrpSpPr>
         <p:grpSpPr>
           <a:xfrm>
-            <a:off x="291737" y="1037381"/>
-            <a:ext cx="5760720" cy="4125325"/>
-            <a:chOff x="291737" y="1037381"/>
-            <a:chExt cx="5760720" cy="4125325"/>
+            <a:off x="87086" y="740742"/>
+            <a:ext cx="6627585" cy="4906701"/>
+            <a:chOff x="257185" y="319812"/>
+            <a:chExt cx="6858000" cy="4842894"/>
           </a:xfrm>
         </p:grpSpPr>
         <p:pic>
           <p:nvPicPr>
-            <p:cNvPr id="17" name="Picture 16">
+            <p:cNvPr id="4" name="Picture 3">
               <a:extLst>
                 <a:ext uri="{FF2B5EF4-FFF2-40B4-BE49-F238E27FC236}">
-                  <a16:creationId xmlns:a16="http://schemas.microsoft.com/office/drawing/2014/main" id="{8C2F46C3-1205-A347-A593-B983982EA029}"/>
+                  <a16:creationId xmlns:a16="http://schemas.microsoft.com/office/drawing/2014/main" id="{597A2CF1-30B4-E94E-807D-E4B17DBAE9A4}"/>
                 </a:ext>
               </a:extLst>
             </p:cNvPr>
@@ -12361,128 +12531,149 @@
             <p:nvPr/>
           </p:nvPicPr>
           <p:blipFill rotWithShape="1">
-            <a:blip r:embed="rId2"/>
-            <a:srcRect r="9589"/>
+            <a:blip r:embed="rId3"/>
+            <a:srcRect r="9765"/>
             <a:stretch/>
           </p:blipFill>
           <p:spPr>
             <a:xfrm rot="5400000">
-              <a:off x="1293598" y="35520"/>
-              <a:ext cx="3756998" cy="5760720"/>
+              <a:off x="1454257" y="-877260"/>
+              <a:ext cx="4463855" cy="6858000"/>
             </a:xfrm>
             <a:prstGeom prst="rect">
               <a:avLst/>
             </a:prstGeom>
           </p:spPr>
         </p:pic>
-        <p:sp>
-          <p:nvSpPr>
-            <p:cNvPr id="19" name="TextBox 18">
+        <p:grpSp>
+          <p:nvGrpSpPr>
+            <p:cNvPr id="18" name="Group 17">
               <a:extLst>
                 <a:ext uri="{FF2B5EF4-FFF2-40B4-BE49-F238E27FC236}">
-                  <a16:creationId xmlns:a16="http://schemas.microsoft.com/office/drawing/2014/main" id="{2521B4B8-C656-704A-B803-6CDAFA9FCAAD}"/>
+                  <a16:creationId xmlns:a16="http://schemas.microsoft.com/office/drawing/2014/main" id="{5EAA8B74-D7BA-9D40-B2B4-DA4678ED5A9D}"/>
                 </a:ext>
               </a:extLst>
             </p:cNvPr>
-            <p:cNvSpPr txBox="1"/>
+            <p:cNvGrpSpPr/>
             <p:nvPr/>
-          </p:nvSpPr>
-          <p:spPr>
+          </p:nvGrpSpPr>
+          <p:grpSpPr>
             <a:xfrm>
               <a:off x="480811" y="4845833"/>
-              <a:ext cx="1715249" cy="307777"/>
+              <a:ext cx="5145747" cy="316873"/>
+              <a:chOff x="480811" y="4845833"/>
+              <a:chExt cx="5145747" cy="316873"/>
             </a:xfrm>
-            <a:prstGeom prst="rect">
-              <a:avLst/>
-            </a:prstGeom>
-            <a:noFill/>
-          </p:spPr>
-          <p:txBody>
-            <a:bodyPr wrap="square" rtlCol="0">
-              <a:spAutoFit/>
-            </a:bodyPr>
-            <a:lstStyle/>
-            <a:p>
-              <a:pPr algn="ctr"/>
-              <a:r>
-                <a:rPr lang="en-GR" sz="1400" dirty="0"/>
-                <a:t>pT [400,600]GeV</a:t>
-              </a:r>
-            </a:p>
-          </p:txBody>
-        </p:sp>
-        <p:sp>
-          <p:nvSpPr>
-            <p:cNvPr id="20" name="TextBox 19">
-              <a:extLst>
-                <a:ext uri="{FF2B5EF4-FFF2-40B4-BE49-F238E27FC236}">
-                  <a16:creationId xmlns:a16="http://schemas.microsoft.com/office/drawing/2014/main" id="{E6188C44-C940-E74D-AFFD-39103215D596}"/>
-                </a:ext>
-              </a:extLst>
-            </p:cNvPr>
-            <p:cNvSpPr txBox="1"/>
-            <p:nvPr/>
-          </p:nvSpPr>
-          <p:spPr>
-            <a:xfrm>
-              <a:off x="2196060" y="4850381"/>
-              <a:ext cx="1715249" cy="307777"/>
-            </a:xfrm>
-            <a:prstGeom prst="rect">
-              <a:avLst/>
-            </a:prstGeom>
-            <a:noFill/>
-          </p:spPr>
-          <p:txBody>
-            <a:bodyPr wrap="square" rtlCol="0">
-              <a:spAutoFit/>
-            </a:bodyPr>
-            <a:lstStyle/>
-            <a:p>
-              <a:pPr algn="ctr"/>
-              <a:r>
-                <a:rPr lang="en-GR" sz="1400" dirty="0"/>
-                <a:t>pT [600,800]GeV</a:t>
-              </a:r>
-            </a:p>
-          </p:txBody>
-        </p:sp>
-        <p:sp>
-          <p:nvSpPr>
-            <p:cNvPr id="21" name="TextBox 20">
-              <a:extLst>
-                <a:ext uri="{FF2B5EF4-FFF2-40B4-BE49-F238E27FC236}">
-                  <a16:creationId xmlns:a16="http://schemas.microsoft.com/office/drawing/2014/main" id="{3F7F47BA-E74B-E04F-9775-5C98CB438657}"/>
-                </a:ext>
-              </a:extLst>
-            </p:cNvPr>
-            <p:cNvSpPr txBox="1"/>
-            <p:nvPr/>
-          </p:nvSpPr>
-          <p:spPr>
-            <a:xfrm>
-              <a:off x="3911309" y="4854929"/>
-              <a:ext cx="1715249" cy="307777"/>
-            </a:xfrm>
-            <a:prstGeom prst="rect">
-              <a:avLst/>
-            </a:prstGeom>
-            <a:noFill/>
-          </p:spPr>
-          <p:txBody>
-            <a:bodyPr wrap="square" rtlCol="0">
-              <a:spAutoFit/>
-            </a:bodyPr>
-            <a:lstStyle/>
-            <a:p>
-              <a:pPr algn="ctr"/>
-              <a:r>
-                <a:rPr lang="en-GR" sz="1400" dirty="0"/>
-                <a:t>pT [800,Inf]GeV</a:t>
-              </a:r>
-            </a:p>
-          </p:txBody>
-        </p:sp>
+          </p:grpSpPr>
+          <p:sp>
+            <p:nvSpPr>
+              <p:cNvPr id="19" name="TextBox 18">
+                <a:extLst>
+                  <a:ext uri="{FF2B5EF4-FFF2-40B4-BE49-F238E27FC236}">
+                    <a16:creationId xmlns:a16="http://schemas.microsoft.com/office/drawing/2014/main" id="{2521B4B8-C656-704A-B803-6CDAFA9FCAAD}"/>
+                  </a:ext>
+                </a:extLst>
+              </p:cNvPr>
+              <p:cNvSpPr txBox="1"/>
+              <p:nvPr/>
+            </p:nvSpPr>
+            <p:spPr>
+              <a:xfrm>
+                <a:off x="480811" y="4845833"/>
+                <a:ext cx="1715249" cy="307777"/>
+              </a:xfrm>
+              <a:prstGeom prst="rect">
+                <a:avLst/>
+              </a:prstGeom>
+              <a:noFill/>
+            </p:spPr>
+            <p:txBody>
+              <a:bodyPr wrap="square" rtlCol="0">
+                <a:spAutoFit/>
+              </a:bodyPr>
+              <a:lstStyle/>
+              <a:p>
+                <a:pPr algn="ctr"/>
+                <a:r>
+                  <a:rPr lang="en-GR" sz="1400" dirty="0"/>
+                  <a:t>pT [400,600]GeV</a:t>
+                </a:r>
+              </a:p>
+            </p:txBody>
+          </p:sp>
+          <p:sp>
+            <p:nvSpPr>
+              <p:cNvPr id="20" name="TextBox 19">
+                <a:extLst>
+                  <a:ext uri="{FF2B5EF4-FFF2-40B4-BE49-F238E27FC236}">
+                    <a16:creationId xmlns:a16="http://schemas.microsoft.com/office/drawing/2014/main" id="{E6188C44-C940-E74D-AFFD-39103215D596}"/>
+                  </a:ext>
+                </a:extLst>
+              </p:cNvPr>
+              <p:cNvSpPr txBox="1"/>
+              <p:nvPr/>
+            </p:nvSpPr>
+            <p:spPr>
+              <a:xfrm>
+                <a:off x="2196060" y="4850381"/>
+                <a:ext cx="1715249" cy="307777"/>
+              </a:xfrm>
+              <a:prstGeom prst="rect">
+                <a:avLst/>
+              </a:prstGeom>
+              <a:noFill/>
+            </p:spPr>
+            <p:txBody>
+              <a:bodyPr wrap="square" rtlCol="0">
+                <a:spAutoFit/>
+              </a:bodyPr>
+              <a:lstStyle/>
+              <a:p>
+                <a:pPr algn="ctr"/>
+                <a:r>
+                  <a:rPr lang="en-GR" sz="1400" dirty="0"/>
+                  <a:t>pT [600,800]GeV</a:t>
+                </a:r>
+              </a:p>
+            </p:txBody>
+          </p:sp>
+          <p:sp>
+            <p:nvSpPr>
+              <p:cNvPr id="21" name="TextBox 20">
+                <a:extLst>
+                  <a:ext uri="{FF2B5EF4-FFF2-40B4-BE49-F238E27FC236}">
+                    <a16:creationId xmlns:a16="http://schemas.microsoft.com/office/drawing/2014/main" id="{3F7F47BA-E74B-E04F-9775-5C98CB438657}"/>
+                  </a:ext>
+                </a:extLst>
+              </p:cNvPr>
+              <p:cNvSpPr txBox="1"/>
+              <p:nvPr/>
+            </p:nvSpPr>
+            <p:spPr>
+              <a:xfrm>
+                <a:off x="3911309" y="4854929"/>
+                <a:ext cx="1715249" cy="307777"/>
+              </a:xfrm>
+              <a:prstGeom prst="rect">
+                <a:avLst/>
+              </a:prstGeom>
+              <a:noFill/>
+            </p:spPr>
+            <p:txBody>
+              <a:bodyPr wrap="square" rtlCol="0">
+                <a:spAutoFit/>
+              </a:bodyPr>
+              <a:lstStyle/>
+              <a:p>
+                <a:pPr algn="ctr"/>
+                <a:r>
+                  <a:rPr lang="en-GR" sz="1400" dirty="0"/>
+                  <a:t>pT [800,Inf]GeV</a:t>
+                </a:r>
+              </a:p>
+            </p:txBody>
+          </p:sp>
+        </p:grpSp>
       </p:grpSp>
     </p:spTree>
     <p:extLst>

</xml_diff>